<commit_message>
doc[presentation]: Make changes in the project presentation
</commit_message>
<xml_diff>
--- a/devils/presentation/PROJECT PROPOSAL.pptx
+++ b/devils/presentation/PROJECT PROPOSAL.pptx
@@ -6238,10 +6238,18 @@
               <a:buNone/>
             </a:pPr>
             <a:r>
-              <a:rPr lang="en"/>
+              <a:rPr lang="en">
+                <a:solidFill>
+                  <a:srgbClr val="FF0000"/>
+                </a:solidFill>
+              </a:rPr>
               <a:t>Karpagam Institute of Technology</a:t>
             </a:r>
-            <a:endParaRPr/>
+            <a:endParaRPr>
+              <a:solidFill>
+                <a:srgbClr val="FF0000"/>
+              </a:solidFill>
+            </a:endParaRPr>
           </a:p>
         </p:txBody>
       </p:sp>
@@ -6328,7 +6336,7 @@
           </a:bodyPr>
           <a:lstStyle/>
           <a:p>
-            <a:pPr indent="-316071" lvl="0" marL="457200" rtl="0" algn="l">
+            <a:pPr indent="-354409" lvl="0" marL="457200" rtl="0" algn="l">
               <a:lnSpc>
                 <a:spcPct val="200000"/>
               </a:lnSpc>
@@ -6342,13 +6350,13 @@
               <a:buChar char="☺"/>
             </a:pPr>
             <a:r>
-              <a:rPr b="1" lang="en" sz="2900"/>
+              <a:rPr b="1" lang="en" sz="4171"/>
               <a:t>Kavin Kumar K</a:t>
             </a:r>
-            <a:endParaRPr b="1" sz="2900"/>
+            <a:endParaRPr b="1" sz="4171"/>
           </a:p>
           <a:p>
-            <a:pPr indent="-316071" lvl="0" marL="457200" rtl="0" algn="l">
+            <a:pPr indent="-347821" lvl="0" marL="457200" rtl="0" algn="l">
               <a:lnSpc>
                 <a:spcPct val="200000"/>
               </a:lnSpc>
@@ -6362,13 +6370,13 @@
               <a:buChar char="☺"/>
             </a:pPr>
             <a:r>
-              <a:rPr b="1" lang="en" sz="2900"/>
+              <a:rPr b="1" lang="en" sz="3952"/>
               <a:t>Kaviya V</a:t>
             </a:r>
-            <a:endParaRPr b="1" sz="2900"/>
+            <a:endParaRPr b="1" sz="3952"/>
           </a:p>
           <a:p>
-            <a:pPr indent="-316071" lvl="0" marL="457200" rtl="0" algn="l">
+            <a:pPr indent="-347821" lvl="0" marL="457200" rtl="0" algn="l">
               <a:lnSpc>
                 <a:spcPct val="200000"/>
               </a:lnSpc>
@@ -6382,10 +6390,10 @@
               <a:buChar char="☺"/>
             </a:pPr>
             <a:r>
-              <a:rPr b="1" lang="en" sz="2900"/>
+              <a:rPr b="1" lang="en" sz="3952"/>
               <a:t>Monika M</a:t>
             </a:r>
-            <a:endParaRPr b="1" sz="2900"/>
+            <a:endParaRPr b="1" sz="3952"/>
           </a:p>
           <a:p>
             <a:pPr indent="0" lvl="0" marL="0" rtl="0" algn="l">
@@ -6470,7 +6478,7 @@
             <a:r>
               <a:rPr lang="en" sz="4100">
                 <a:solidFill>
-                  <a:srgbClr val="434343"/>
+                  <a:srgbClr val="CC0000"/>
                 </a:solidFill>
               </a:rPr>
               <a:t>                                        </a:t>
@@ -6478,7 +6486,7 @@
             <a:r>
               <a:rPr lang="en" sz="4100" u="sng">
                 <a:solidFill>
-                  <a:srgbClr val="434343"/>
+                  <a:srgbClr val="CC0000"/>
                 </a:solidFill>
               </a:rPr>
               <a:t>Team Members</a:t>
@@ -6486,14 +6494,14 @@
             <a:r>
               <a:rPr lang="en" sz="4100">
                 <a:solidFill>
-                  <a:srgbClr val="434343"/>
+                  <a:srgbClr val="CC0000"/>
                 </a:solidFill>
               </a:rPr>
               <a:t>:    </a:t>
             </a:r>
             <a:endParaRPr b="0" sz="4100">
               <a:solidFill>
-                <a:srgbClr val="434343"/>
+                <a:srgbClr val="CC0000"/>
               </a:solidFill>
             </a:endParaRPr>
           </a:p>
@@ -6585,10 +6593,18 @@
               <a:buNone/>
             </a:pPr>
             <a:r>
-              <a:rPr lang="en"/>
+              <a:rPr lang="en">
+                <a:solidFill>
+                  <a:srgbClr val="FF0000"/>
+                </a:solidFill>
+              </a:rPr>
               <a:t>EDUCATION</a:t>
             </a:r>
-            <a:endParaRPr/>
+            <a:endParaRPr>
+              <a:solidFill>
+                <a:srgbClr val="FF0000"/>
+              </a:solidFill>
+            </a:endParaRPr>
           </a:p>
         </p:txBody>
       </p:sp>
@@ -6689,7 +6705,7 @@
         <p:spPr>
           <a:xfrm>
             <a:off x="2624850" y="2564175"/>
-            <a:ext cx="5302800" cy="1200600"/>
+            <a:ext cx="5302800" cy="2555100"/>
           </a:xfrm>
           <a:prstGeom prst="rect">
             <a:avLst/>
@@ -6714,7 +6730,7 @@
               </a:spcAft>
               <a:buSzPts val="2200"/>
               <a:buFont typeface="Nunito"/>
-              <a:buChar char="●"/>
+              <a:buChar char="➥"/>
             </a:pPr>
             <a:r>
               <a:rPr b="1" lang="en" sz="2200">
@@ -6723,7 +6739,16 @@
                 <a:cs typeface="Nunito"/>
                 <a:sym typeface="Nunito"/>
               </a:rPr>
-              <a:t>Government needs to monitor Individual school</a:t>
+              <a:t>This system will help the </a:t>
+            </a:r>
+            <a:r>
+              <a:rPr b="1" lang="en" sz="2200">
+                <a:latin typeface="Nunito"/>
+                <a:ea typeface="Nunito"/>
+                <a:cs typeface="Nunito"/>
+                <a:sym typeface="Nunito"/>
+              </a:rPr>
+              <a:t>Government  to monitor every individual school in their respective district/state /country.</a:t>
             </a:r>
             <a:endParaRPr b="1" sz="2200">
               <a:latin typeface="Nunito"/>
@@ -6742,7 +6767,7 @@
               </a:spcAft>
               <a:buSzPts val="2200"/>
               <a:buFont typeface="Nunito"/>
-              <a:buChar char="●"/>
+              <a:buChar char="➥"/>
             </a:pPr>
             <a:r>
               <a:rPr b="1" lang="en" sz="2200">
@@ -6751,7 +6776,7 @@
                 <a:cs typeface="Nunito"/>
                 <a:sym typeface="Nunito"/>
               </a:rPr>
-              <a:t>Gave Solution to solve the problem</a:t>
+              <a:t>This project will give the solution to solve the problems of school dropout students.</a:t>
             </a:r>
             <a:endParaRPr b="1" sz="2200">
               <a:latin typeface="Nunito"/>
@@ -6820,10 +6845,24 @@
               <a:buNone/>
             </a:pPr>
             <a:r>
-              <a:rPr b="1" lang="en"/>
-              <a:t>Reasons for Drop out</a:t>
+              <a:rPr b="1" lang="en">
+                <a:solidFill>
+                  <a:schemeClr val="accent2"/>
+                </a:solidFill>
+                <a:highlight>
+                  <a:srgbClr val="F3F3F3"/>
+                </a:highlight>
+              </a:rPr>
+              <a:t>Reasons for school Dropout :</a:t>
             </a:r>
-            <a:endParaRPr b="1"/>
+            <a:endParaRPr b="1">
+              <a:solidFill>
+                <a:schemeClr val="accent2"/>
+              </a:solidFill>
+              <a:highlight>
+                <a:srgbClr val="F3F3F3"/>
+              </a:highlight>
+            </a:endParaRPr>
           </a:p>
         </p:txBody>
       </p:sp>
@@ -7199,10 +7238,10 @@
               <a:buNone/>
             </a:pPr>
             <a:r>
-              <a:rPr lang="en"/>
+              <a:rPr b="1" lang="en"/>
               <a:t>Proposed System:</a:t>
             </a:r>
-            <a:endParaRPr/>
+            <a:endParaRPr b="1"/>
           </a:p>
         </p:txBody>
       </p:sp>
@@ -7215,7 +7254,7 @@
         <p:spPr>
           <a:xfrm>
             <a:off x="409650" y="1228975"/>
-            <a:ext cx="7927800" cy="2555100"/>
+            <a:ext cx="7927800" cy="3417000"/>
           </a:xfrm>
           <a:prstGeom prst="rect">
             <a:avLst/>
@@ -7246,7 +7285,7 @@
             </a:pPr>
             <a:r>
               <a:rPr lang="en"/>
-              <a:t>Student aadhar as primary key of the student table</a:t>
+              <a:t>Student’s aadhar as primary key for the student table.</a:t>
             </a:r>
             <a:endParaRPr/>
           </a:p>
@@ -7266,7 +7305,26 @@
             </a:pPr>
             <a:r>
               <a:rPr lang="en"/>
-              <a:t>Schools will have a unique login-id after registering in the web portal</a:t>
+              <a:t>Schools will have a unique login-id after registering in the particular web </a:t>
+            </a:r>
+            <a:endParaRPr/>
+          </a:p>
+          <a:p>
+            <a:pPr indent="0" lvl="0" marL="0" rtl="0" algn="l">
+              <a:lnSpc>
+                <a:spcPct val="200000"/>
+              </a:lnSpc>
+              <a:spcBef>
+                <a:spcPts val="0"/>
+              </a:spcBef>
+              <a:spcAft>
+                <a:spcPts val="0"/>
+              </a:spcAft>
+              <a:buNone/>
+            </a:pPr>
+            <a:r>
+              <a:rPr lang="en"/>
+              <a:t>          portal.</a:t>
             </a:r>
             <a:endParaRPr/>
           </a:p>
@@ -7286,7 +7344,7 @@
             </a:pPr>
             <a:r>
               <a:rPr lang="en"/>
-              <a:t>Sorting of year –wise data based on marks through standardization</a:t>
+              <a:t>Sorting is done using  year –wise data based on marks through standardization.</a:t>
             </a:r>
             <a:endParaRPr/>
           </a:p>
@@ -7306,7 +7364,7 @@
             </a:pPr>
             <a:r>
               <a:rPr lang="en"/>
-              <a:t>Generate Edu-score based on the Academics and Extracurricular activities</a:t>
+              <a:t>Generation of  Edu-score based on the Academics and Extracurricular activities will be done.</a:t>
             </a:r>
             <a:endParaRPr/>
           </a:p>
@@ -7326,7 +7384,7 @@
             </a:pPr>
             <a:r>
               <a:rPr lang="en"/>
-              <a:t>Generate Reports to year-wise Data that will let us know about the Dropouts</a:t>
+              <a:t>Generation of  Reports based on  year-wise Data will let us know about the Dropouts.</a:t>
             </a:r>
             <a:endParaRPr/>
           </a:p>
@@ -7346,7 +7404,7 @@
             </a:pPr>
             <a:r>
               <a:rPr lang="en"/>
-              <a:t>Pi-chart to Represent the region wise School drop out</a:t>
+              <a:t>Pi-chart will help to Represent the region wise School drop out.</a:t>
             </a:r>
             <a:endParaRPr/>
           </a:p>
@@ -7438,10 +7496,10 @@
               <a:buNone/>
             </a:pPr>
             <a:r>
-              <a:rPr lang="en"/>
+              <a:rPr b="1" lang="en"/>
               <a:t>Advantages:</a:t>
             </a:r>
-            <a:endParaRPr/>
+            <a:endParaRPr b="1"/>
           </a:p>
         </p:txBody>
       </p:sp>
@@ -7454,7 +7512,7 @@
         <p:spPr>
           <a:xfrm>
             <a:off x="409650" y="1228975"/>
-            <a:ext cx="7927800" cy="831300"/>
+            <a:ext cx="7927800" cy="1693200"/>
           </a:xfrm>
           <a:prstGeom prst="rect">
             <a:avLst/>
@@ -7485,7 +7543,47 @@
             </a:pPr>
             <a:r>
               <a:rPr lang="en"/>
-              <a:t>To generate the number of school drop-out and hence exercise  control on child labor , child marriage. According to the data generated , the government can implement suitable reforms.</a:t>
+              <a:t>Generation of  the number of school drop-out  will be identified.</a:t>
+            </a:r>
+            <a:endParaRPr/>
+          </a:p>
+          <a:p>
+            <a:pPr indent="-317500" lvl="0" marL="457200" rtl="0" algn="l">
+              <a:lnSpc>
+                <a:spcPct val="200000"/>
+              </a:lnSpc>
+              <a:spcBef>
+                <a:spcPts val="0"/>
+              </a:spcBef>
+              <a:spcAft>
+                <a:spcPts val="0"/>
+              </a:spcAft>
+              <a:buSzPts val="1400"/>
+              <a:buChar char="❖"/>
+            </a:pPr>
+            <a:r>
+              <a:rPr lang="en"/>
+              <a:t>The data will help to exercise  control on child labor , child marriage etc. </a:t>
+            </a:r>
+            <a:endParaRPr/>
+          </a:p>
+          <a:p>
+            <a:pPr indent="-317500" lvl="0" marL="457200" rtl="0" algn="l">
+              <a:lnSpc>
+                <a:spcPct val="200000"/>
+              </a:lnSpc>
+              <a:spcBef>
+                <a:spcPts val="0"/>
+              </a:spcBef>
+              <a:spcAft>
+                <a:spcPts val="0"/>
+              </a:spcAft>
+              <a:buSzPts val="1400"/>
+              <a:buChar char="❖"/>
+            </a:pPr>
+            <a:r>
+              <a:rPr lang="en"/>
+              <a:t>According to the data generated , the government can implement suitable reforms for the victim.</a:t>
             </a:r>
             <a:endParaRPr/>
           </a:p>
@@ -7535,7 +7633,7 @@
         </p:blipFill>
         <p:spPr>
           <a:xfrm>
-            <a:off x="3133775" y="2271525"/>
+            <a:off x="3113700" y="2853025"/>
             <a:ext cx="2181225" cy="2095500"/>
           </a:xfrm>
           <a:prstGeom prst="rect">
@@ -7605,10 +7703,10 @@
               <a:buNone/>
             </a:pPr>
             <a:r>
-              <a:rPr lang="en"/>
+              <a:rPr b="1" lang="en"/>
               <a:t>Technology Stack:</a:t>
             </a:r>
-            <a:endParaRPr/>
+            <a:endParaRPr b="1"/>
           </a:p>
         </p:txBody>
       </p:sp>
@@ -7621,7 +7719,7 @@
         <p:spPr>
           <a:xfrm>
             <a:off x="477925" y="1137950"/>
-            <a:ext cx="7920000" cy="1262100"/>
+            <a:ext cx="7920000" cy="1369800"/>
           </a:xfrm>
           <a:prstGeom prst="rect">
             <a:avLst/>
@@ -7651,8 +7749,12 @@
               <a:buChar char="❏"/>
             </a:pPr>
             <a:r>
+              <a:rPr b="1" lang="en" sz="1600"/>
+              <a:t>Front-end Technology : </a:t>
+            </a:r>
+            <a:r>
               <a:rPr lang="en"/>
-              <a:t>Front-end Technology : HTML , CSS , JS</a:t>
+              <a:t>HTML , CSS , JS</a:t>
             </a:r>
             <a:endParaRPr/>
           </a:p>
@@ -7671,8 +7773,12 @@
               <a:buChar char="❏"/>
             </a:pPr>
             <a:r>
+              <a:rPr b="1" lang="en" sz="1500"/>
+              <a:t>Back-end Technology : </a:t>
+            </a:r>
+            <a:r>
               <a:rPr lang="en"/>
-              <a:t>Back-end Technology : PHP,	 flask</a:t>
+              <a:t>PHP,	 flask</a:t>
             </a:r>
             <a:endParaRPr/>
           </a:p>
@@ -7691,8 +7797,12 @@
               <a:buChar char="❏"/>
             </a:pPr>
             <a:r>
+              <a:rPr b="1" lang="en" sz="1500"/>
+              <a:t>Database :  </a:t>
+            </a:r>
+            <a:r>
               <a:rPr lang="en"/>
-              <a:t>Database :  MySQL</a:t>
+              <a:t>MySQL</a:t>
             </a:r>
             <a:endParaRPr/>
           </a:p>

</xml_diff>